<commit_message>
Added mockups for mecoms level
</commit_message>
<xml_diff>
--- a/Project/doc/Documentatie Sam/Mockups - Designs - Manuals/_General - Templates_/lvl_TGO_ui_template.pptx
+++ b/Project/doc/Documentatie Sam/Mockups - Designs - Manuals/_General - Templates_/lvl_TGO_ui_template.pptx
@@ -261,7 +261,7 @@
           <a:p>
             <a:fld id="{CE1695FB-F0E8-4FAE-A24C-33DD78ED6401}" type="datetimeFigureOut">
               <a:rPr lang="nl-BE" smtClean="0"/>
-              <a:t>14/03/2019</a:t>
+              <a:t>8/04/2019</a:t>
             </a:fld>
             <a:endParaRPr lang="nl-BE"/>
           </a:p>
@@ -461,7 +461,7 @@
           <a:p>
             <a:fld id="{CE1695FB-F0E8-4FAE-A24C-33DD78ED6401}" type="datetimeFigureOut">
               <a:rPr lang="nl-BE" smtClean="0"/>
-              <a:t>14/03/2019</a:t>
+              <a:t>8/04/2019</a:t>
             </a:fld>
             <a:endParaRPr lang="nl-BE"/>
           </a:p>
@@ -671,7 +671,7 @@
           <a:p>
             <a:fld id="{CE1695FB-F0E8-4FAE-A24C-33DD78ED6401}" type="datetimeFigureOut">
               <a:rPr lang="nl-BE" smtClean="0"/>
-              <a:t>14/03/2019</a:t>
+              <a:t>8/04/2019</a:t>
             </a:fld>
             <a:endParaRPr lang="nl-BE"/>
           </a:p>
@@ -871,7 +871,7 @@
           <a:p>
             <a:fld id="{CE1695FB-F0E8-4FAE-A24C-33DD78ED6401}" type="datetimeFigureOut">
               <a:rPr lang="nl-BE" smtClean="0"/>
-              <a:t>14/03/2019</a:t>
+              <a:t>8/04/2019</a:t>
             </a:fld>
             <a:endParaRPr lang="nl-BE"/>
           </a:p>
@@ -1147,7 +1147,7 @@
           <a:p>
             <a:fld id="{CE1695FB-F0E8-4FAE-A24C-33DD78ED6401}" type="datetimeFigureOut">
               <a:rPr lang="nl-BE" smtClean="0"/>
-              <a:t>14/03/2019</a:t>
+              <a:t>8/04/2019</a:t>
             </a:fld>
             <a:endParaRPr lang="nl-BE"/>
           </a:p>
@@ -1415,7 +1415,7 @@
           <a:p>
             <a:fld id="{CE1695FB-F0E8-4FAE-A24C-33DD78ED6401}" type="datetimeFigureOut">
               <a:rPr lang="nl-BE" smtClean="0"/>
-              <a:t>14/03/2019</a:t>
+              <a:t>8/04/2019</a:t>
             </a:fld>
             <a:endParaRPr lang="nl-BE"/>
           </a:p>
@@ -1830,7 +1830,7 @@
           <a:p>
             <a:fld id="{CE1695FB-F0E8-4FAE-A24C-33DD78ED6401}" type="datetimeFigureOut">
               <a:rPr lang="nl-BE" smtClean="0"/>
-              <a:t>14/03/2019</a:t>
+              <a:t>8/04/2019</a:t>
             </a:fld>
             <a:endParaRPr lang="nl-BE"/>
           </a:p>
@@ -1972,7 +1972,7 @@
           <a:p>
             <a:fld id="{CE1695FB-F0E8-4FAE-A24C-33DD78ED6401}" type="datetimeFigureOut">
               <a:rPr lang="nl-BE" smtClean="0"/>
-              <a:t>14/03/2019</a:t>
+              <a:t>8/04/2019</a:t>
             </a:fld>
             <a:endParaRPr lang="nl-BE"/>
           </a:p>
@@ -2085,7 +2085,7 @@
           <a:p>
             <a:fld id="{CE1695FB-F0E8-4FAE-A24C-33DD78ED6401}" type="datetimeFigureOut">
               <a:rPr lang="nl-BE" smtClean="0"/>
-              <a:t>14/03/2019</a:t>
+              <a:t>8/04/2019</a:t>
             </a:fld>
             <a:endParaRPr lang="nl-BE"/>
           </a:p>
@@ -2398,7 +2398,7 @@
           <a:p>
             <a:fld id="{CE1695FB-F0E8-4FAE-A24C-33DD78ED6401}" type="datetimeFigureOut">
               <a:rPr lang="nl-BE" smtClean="0"/>
-              <a:t>14/03/2019</a:t>
+              <a:t>8/04/2019</a:t>
             </a:fld>
             <a:endParaRPr lang="nl-BE"/>
           </a:p>
@@ -2687,7 +2687,7 @@
           <a:p>
             <a:fld id="{CE1695FB-F0E8-4FAE-A24C-33DD78ED6401}" type="datetimeFigureOut">
               <a:rPr lang="nl-BE" smtClean="0"/>
-              <a:t>14/03/2019</a:t>
+              <a:t>8/04/2019</a:t>
             </a:fld>
             <a:endParaRPr lang="nl-BE"/>
           </a:p>
@@ -2930,7 +2930,7 @@
           <a:p>
             <a:fld id="{CE1695FB-F0E8-4FAE-A24C-33DD78ED6401}" type="datetimeFigureOut">
               <a:rPr lang="nl-BE" smtClean="0"/>
-              <a:t>14/03/2019</a:t>
+              <a:t>8/04/2019</a:t>
             </a:fld>
             <a:endParaRPr lang="nl-BE"/>
           </a:p>
@@ -3423,65 +3423,22 @@
       </p:sp>
       <p:sp>
         <p:nvSpPr>
-          <p:cNvPr id="14" name="TextBox 13">
-            <a:extLst>
-              <a:ext uri="{FF2B5EF4-FFF2-40B4-BE49-F238E27FC236}">
-                <a16:creationId xmlns:a16="http://schemas.microsoft.com/office/drawing/2014/main" id="{D05AC093-8047-41EA-94A3-38E7FEA4FCD9}"/>
-              </a:ext>
-            </a:extLst>
-          </p:cNvPr>
-          <p:cNvSpPr txBox="1"/>
+          <p:cNvPr id="2" name="Rectangle 1">
+            <a:extLst>
+              <a:ext uri="{FF2B5EF4-FFF2-40B4-BE49-F238E27FC236}">
+                <a16:creationId xmlns:a16="http://schemas.microsoft.com/office/drawing/2014/main" id="{7031AB30-E751-4CA2-8EBB-8D81AA70A267}"/>
+              </a:ext>
+            </a:extLst>
+          </p:cNvPr>
+          <p:cNvSpPr/>
           <p:nvPr/>
         </p:nvSpPr>
         <p:spPr>
           <a:xfrm>
-            <a:off x="7970632" y="144518"/>
-            <a:ext cx="1392824" cy="408623"/>
+            <a:off x="2164080" y="1965960"/>
+            <a:ext cx="7863840" cy="2743200"/>
           </a:xfrm>
-          <a:prstGeom prst="roundRect">
-            <a:avLst/>
-          </a:prstGeom>
-          <a:solidFill>
-            <a:schemeClr val="bg1"/>
-          </a:solidFill>
-          <a:ln>
-            <a:solidFill>
-              <a:schemeClr val="bg1"/>
-            </a:solidFill>
-          </a:ln>
-        </p:spPr>
-        <p:txBody>
-          <a:bodyPr wrap="square" rtlCol="0">
-            <a:spAutoFit/>
-          </a:bodyPr>
-          <a:lstStyle/>
-          <a:p>
-            <a:pPr algn="ctr"/>
-            <a:r>
-              <a:rPr lang="nl-BE" dirty="0"/>
-              <a:t>Minigames</a:t>
-            </a:r>
-          </a:p>
-        </p:txBody>
-      </p:sp>
-      <p:sp>
-        <p:nvSpPr>
-          <p:cNvPr id="15" name="Rectangle: Rounded Corners 14">
-            <a:extLst>
-              <a:ext uri="{FF2B5EF4-FFF2-40B4-BE49-F238E27FC236}">
-                <a16:creationId xmlns:a16="http://schemas.microsoft.com/office/drawing/2014/main" id="{D856C267-607F-46BC-848C-A90000AAC177}"/>
-              </a:ext>
-            </a:extLst>
-          </p:cNvPr>
-          <p:cNvSpPr/>
-          <p:nvPr/>
-        </p:nvSpPr>
-        <p:spPr>
-          <a:xfrm>
-            <a:off x="8055864" y="668713"/>
-            <a:ext cx="3840480" cy="6009394"/>
-          </a:xfrm>
-          <a:prstGeom prst="roundRect">
+          <a:prstGeom prst="rect">
             <a:avLst/>
           </a:prstGeom>
         </p:spPr>
@@ -3512,10 +3469,10 @@
       </p:sp>
       <p:sp>
         <p:nvSpPr>
-          <p:cNvPr id="16" name="Rectangle 15">
-            <a:extLst>
-              <a:ext uri="{FF2B5EF4-FFF2-40B4-BE49-F238E27FC236}">
-                <a16:creationId xmlns:a16="http://schemas.microsoft.com/office/drawing/2014/main" id="{B1F2C8BA-6860-4629-895D-AE6EDF09DB72}"/>
+          <p:cNvPr id="3" name="Rectangle 2">
+            <a:extLst>
+              <a:ext uri="{FF2B5EF4-FFF2-40B4-BE49-F238E27FC236}">
+                <a16:creationId xmlns:a16="http://schemas.microsoft.com/office/drawing/2014/main" id="{BCB14D0F-112D-4DDA-A8DA-94E615841BD8}"/>
               </a:ext>
             </a:extLst>
           </p:cNvPr>
@@ -3524,15 +3481,20 @@
         </p:nvSpPr>
         <p:spPr>
           <a:xfrm>
-            <a:off x="11603736" y="1517904"/>
-            <a:ext cx="228600" cy="4453128"/>
+            <a:off x="2414686" y="2555748"/>
+            <a:ext cx="1562953" cy="1563624"/>
           </a:xfrm>
           <a:prstGeom prst="rect">
             <a:avLst/>
           </a:prstGeom>
           <a:solidFill>
-            <a:schemeClr val="bg2"/>
+            <a:schemeClr val="bg1"/>
           </a:solidFill>
+          <a:ln>
+            <a:solidFill>
+              <a:schemeClr val="bg2"/>
+            </a:solidFill>
+          </a:ln>
         </p:spPr>
         <p:style>
           <a:lnRef idx="2">
@@ -3555,16 +3517,23 @@
           <a:lstStyle/>
           <a:p>
             <a:pPr algn="ctr"/>
-            <a:endParaRPr lang="nl-BE"/>
-          </a:p>
-        </p:txBody>
-      </p:sp>
-      <p:sp>
-        <p:nvSpPr>
-          <p:cNvPr id="17" name="Rectangle 16">
-            <a:extLst>
-              <a:ext uri="{FF2B5EF4-FFF2-40B4-BE49-F238E27FC236}">
-                <a16:creationId xmlns:a16="http://schemas.microsoft.com/office/drawing/2014/main" id="{3AD50182-2E3A-4C19-9A17-6DB6220AF68C}"/>
+            <a:r>
+              <a:rPr lang="nl-BE" dirty="0">
+                <a:solidFill>
+                  <a:schemeClr val="tx1"/>
+                </a:solidFill>
+              </a:rPr>
+              <a:t>Multiple choice</a:t>
+            </a:r>
+          </a:p>
+        </p:txBody>
+      </p:sp>
+      <p:sp>
+        <p:nvSpPr>
+          <p:cNvPr id="20" name="Rectangle 19">
+            <a:extLst>
+              <a:ext uri="{FF2B5EF4-FFF2-40B4-BE49-F238E27FC236}">
+                <a16:creationId xmlns:a16="http://schemas.microsoft.com/office/drawing/2014/main" id="{248590C4-E444-42C2-B657-3FA4D762442F}"/>
               </a:ext>
             </a:extLst>
           </p:cNvPr>
@@ -3573,8 +3542,8 @@
         </p:nvSpPr>
         <p:spPr>
           <a:xfrm>
-            <a:off x="11603736" y="1517904"/>
-            <a:ext cx="228600" cy="1911096"/>
+            <a:off x="4278202" y="2555748"/>
+            <a:ext cx="1562953" cy="1563624"/>
           </a:xfrm>
           <a:prstGeom prst="rect">
             <a:avLst/>
@@ -3582,6 +3551,11 @@
           <a:solidFill>
             <a:schemeClr val="bg1"/>
           </a:solidFill>
+          <a:ln>
+            <a:solidFill>
+              <a:schemeClr val="bg2"/>
+            </a:solidFill>
+          </a:ln>
         </p:spPr>
         <p:style>
           <a:lnRef idx="2">
@@ -3604,16 +3578,23 @@
           <a:lstStyle/>
           <a:p>
             <a:pPr algn="ctr"/>
-            <a:endParaRPr lang="nl-BE"/>
-          </a:p>
-        </p:txBody>
-      </p:sp>
-      <p:sp>
-        <p:nvSpPr>
-          <p:cNvPr id="18" name="Rectangle 17">
-            <a:extLst>
-              <a:ext uri="{FF2B5EF4-FFF2-40B4-BE49-F238E27FC236}">
-                <a16:creationId xmlns:a16="http://schemas.microsoft.com/office/drawing/2014/main" id="{7299BD15-37E1-4853-A9F5-94272722DAF9}"/>
+            <a:r>
+              <a:rPr lang="nl-BE" dirty="0">
+                <a:solidFill>
+                  <a:schemeClr val="tx1"/>
+                </a:solidFill>
+              </a:rPr>
+              <a:t>Odd one out</a:t>
+            </a:r>
+          </a:p>
+        </p:txBody>
+      </p:sp>
+      <p:sp>
+        <p:nvSpPr>
+          <p:cNvPr id="23" name="Rectangle 22">
+            <a:extLst>
+              <a:ext uri="{FF2B5EF4-FFF2-40B4-BE49-F238E27FC236}">
+                <a16:creationId xmlns:a16="http://schemas.microsoft.com/office/drawing/2014/main" id="{9B72BF79-8065-4809-88A2-EA7BD67A3A6B}"/>
               </a:ext>
             </a:extLst>
           </p:cNvPr>
@@ -3622,15 +3603,20 @@
         </p:nvSpPr>
         <p:spPr>
           <a:xfrm>
-            <a:off x="8316468" y="1517904"/>
-            <a:ext cx="1426464" cy="1417320"/>
+            <a:off x="6350845" y="2555748"/>
+            <a:ext cx="1562953" cy="1563624"/>
           </a:xfrm>
           <a:prstGeom prst="rect">
             <a:avLst/>
           </a:prstGeom>
           <a:solidFill>
-            <a:schemeClr val="bg2"/>
+            <a:schemeClr val="bg1"/>
           </a:solidFill>
+          <a:ln>
+            <a:solidFill>
+              <a:schemeClr val="bg2"/>
+            </a:solidFill>
+          </a:ln>
         </p:spPr>
         <p:style>
           <a:lnRef idx="2">
@@ -3653,16 +3639,23 @@
           <a:lstStyle/>
           <a:p>
             <a:pPr algn="ctr"/>
-            <a:endParaRPr lang="nl-BE"/>
-          </a:p>
-        </p:txBody>
-      </p:sp>
-      <p:sp>
-        <p:nvSpPr>
-          <p:cNvPr id="19" name="Rectangle 18">
-            <a:extLst>
-              <a:ext uri="{FF2B5EF4-FFF2-40B4-BE49-F238E27FC236}">
-                <a16:creationId xmlns:a16="http://schemas.microsoft.com/office/drawing/2014/main" id="{838A2E13-A6E0-4630-AA49-937AF8C7F3AD}"/>
+            <a:r>
+              <a:rPr lang="nl-BE" dirty="0">
+                <a:solidFill>
+                  <a:schemeClr val="tx1"/>
+                </a:solidFill>
+              </a:rPr>
+              <a:t>Correct order</a:t>
+            </a:r>
+          </a:p>
+        </p:txBody>
+      </p:sp>
+      <p:sp>
+        <p:nvSpPr>
+          <p:cNvPr id="26" name="Rectangle 25">
+            <a:extLst>
+              <a:ext uri="{FF2B5EF4-FFF2-40B4-BE49-F238E27FC236}">
+                <a16:creationId xmlns:a16="http://schemas.microsoft.com/office/drawing/2014/main" id="{FDD644B4-4808-4AAD-BBEB-4AB374797D58}"/>
               </a:ext>
             </a:extLst>
           </p:cNvPr>
@@ -3671,15 +3664,20 @@
         </p:nvSpPr>
         <p:spPr>
           <a:xfrm>
-            <a:off x="10003536" y="1517904"/>
-            <a:ext cx="1458468" cy="1417320"/>
+            <a:off x="8214361" y="2555748"/>
+            <a:ext cx="1562953" cy="1563624"/>
           </a:xfrm>
           <a:prstGeom prst="rect">
             <a:avLst/>
           </a:prstGeom>
           <a:solidFill>
-            <a:schemeClr val="bg2"/>
+            <a:schemeClr val="bg1"/>
           </a:solidFill>
+          <a:ln>
+            <a:solidFill>
+              <a:schemeClr val="bg2"/>
+            </a:solidFill>
+          </a:ln>
         </p:spPr>
         <p:style>
           <a:lnRef idx="2">
@@ -3702,322 +3700,14 @@
           <a:lstStyle/>
           <a:p>
             <a:pPr algn="ctr"/>
-            <a:endParaRPr lang="nl-BE"/>
-          </a:p>
-        </p:txBody>
-      </p:sp>
-      <p:pic>
-        <p:nvPicPr>
-          <p:cNvPr id="21" name="Picture 20">
-            <a:extLst>
-              <a:ext uri="{FF2B5EF4-FFF2-40B4-BE49-F238E27FC236}">
-                <a16:creationId xmlns:a16="http://schemas.microsoft.com/office/drawing/2014/main" id="{EAEB2613-DC8A-4626-B21C-76AF5BD86E9B}"/>
-              </a:ext>
-            </a:extLst>
-          </p:cNvPr>
-          <p:cNvPicPr>
-            <a:picLocks noChangeAspect="1"/>
-          </p:cNvPicPr>
-          <p:nvPr/>
-        </p:nvPicPr>
-        <p:blipFill>
-          <a:blip r:embed="rId3">
-            <a:extLst>
-              <a:ext uri="{28A0092B-C50C-407E-A947-70E740481C1C}">
-                <a14:useLocalDpi xmlns:a14="http://schemas.microsoft.com/office/drawing/2010/main" val="0"/>
-              </a:ext>
-            </a:extLst>
-          </a:blip>
-          <a:stretch>
-            <a:fillRect/>
-          </a:stretch>
-        </p:blipFill>
-        <p:spPr>
-          <a:xfrm>
-            <a:off x="8316468" y="1525381"/>
-            <a:ext cx="1417828" cy="1063371"/>
-          </a:xfrm>
-          <a:prstGeom prst="rect">
-            <a:avLst/>
-          </a:prstGeom>
-        </p:spPr>
-      </p:pic>
-      <p:sp>
-        <p:nvSpPr>
-          <p:cNvPr id="22" name="TextBox 21">
-            <a:extLst>
-              <a:ext uri="{FF2B5EF4-FFF2-40B4-BE49-F238E27FC236}">
-                <a16:creationId xmlns:a16="http://schemas.microsoft.com/office/drawing/2014/main" id="{239BC56C-1CEE-456C-94A0-AB9913484A82}"/>
-              </a:ext>
-            </a:extLst>
-          </p:cNvPr>
-          <p:cNvSpPr txBox="1"/>
-          <p:nvPr/>
-        </p:nvSpPr>
-        <p:spPr>
-          <a:xfrm>
-            <a:off x="8316468" y="2588752"/>
-            <a:ext cx="1417828" cy="369332"/>
-          </a:xfrm>
-          <a:prstGeom prst="rect">
-            <a:avLst/>
-          </a:prstGeom>
-          <a:noFill/>
-        </p:spPr>
-        <p:txBody>
-          <a:bodyPr wrap="square" rtlCol="0">
-            <a:spAutoFit/>
-          </a:bodyPr>
-          <a:lstStyle/>
-          <a:p>
-            <a:pPr algn="ctr"/>
-            <a:r>
-              <a:rPr lang="nl-BE" dirty="0"/>
-              <a:t>Memory</a:t>
-            </a:r>
-          </a:p>
-        </p:txBody>
-      </p:sp>
-      <p:pic>
-        <p:nvPicPr>
-          <p:cNvPr id="24" name="Picture 23">
-            <a:extLst>
-              <a:ext uri="{FF2B5EF4-FFF2-40B4-BE49-F238E27FC236}">
-                <a16:creationId xmlns:a16="http://schemas.microsoft.com/office/drawing/2014/main" id="{4B758E5B-9337-4F40-B376-51A648088F16}"/>
-              </a:ext>
-            </a:extLst>
-          </p:cNvPr>
-          <p:cNvPicPr>
-            <a:picLocks noChangeAspect="1"/>
-          </p:cNvPicPr>
-          <p:nvPr/>
-        </p:nvPicPr>
-        <p:blipFill>
-          <a:blip r:embed="rId4">
-            <a:extLst>
-              <a:ext uri="{28A0092B-C50C-407E-A947-70E740481C1C}">
-                <a14:useLocalDpi xmlns:a14="http://schemas.microsoft.com/office/drawing/2010/main" val="0"/>
-              </a:ext>
-            </a:extLst>
-          </a:blip>
-          <a:stretch>
-            <a:fillRect/>
-          </a:stretch>
-        </p:blipFill>
-        <p:spPr>
-          <a:xfrm>
-            <a:off x="10124034" y="1610660"/>
-            <a:ext cx="1217471" cy="892812"/>
-          </a:xfrm>
-          <a:prstGeom prst="rect">
-            <a:avLst/>
-          </a:prstGeom>
-        </p:spPr>
-      </p:pic>
-      <p:sp>
-        <p:nvSpPr>
-          <p:cNvPr id="25" name="TextBox 24">
-            <a:extLst>
-              <a:ext uri="{FF2B5EF4-FFF2-40B4-BE49-F238E27FC236}">
-                <a16:creationId xmlns:a16="http://schemas.microsoft.com/office/drawing/2014/main" id="{462A898F-05EF-430C-AE68-58F1F6541483}"/>
-              </a:ext>
-            </a:extLst>
-          </p:cNvPr>
-          <p:cNvSpPr txBox="1"/>
-          <p:nvPr/>
-        </p:nvSpPr>
-        <p:spPr>
-          <a:xfrm>
-            <a:off x="9994900" y="2585658"/>
-            <a:ext cx="1458468" cy="369332"/>
-          </a:xfrm>
-          <a:prstGeom prst="rect">
-            <a:avLst/>
-          </a:prstGeom>
-          <a:noFill/>
-        </p:spPr>
-        <p:txBody>
-          <a:bodyPr wrap="square" rtlCol="0">
-            <a:spAutoFit/>
-          </a:bodyPr>
-          <a:lstStyle/>
-          <a:p>
-            <a:pPr algn="ctr"/>
-            <a:r>
-              <a:rPr lang="nl-BE" dirty="0"/>
-              <a:t>Breakout</a:t>
-            </a:r>
-          </a:p>
-        </p:txBody>
-      </p:sp>
-      <p:sp>
-        <p:nvSpPr>
-          <p:cNvPr id="28" name="Rectangle 27">
-            <a:extLst>
-              <a:ext uri="{FF2B5EF4-FFF2-40B4-BE49-F238E27FC236}">
-                <a16:creationId xmlns:a16="http://schemas.microsoft.com/office/drawing/2014/main" id="{BD4A4508-6AB2-40D5-B7A9-8DCEDF327C1A}"/>
-              </a:ext>
-            </a:extLst>
-          </p:cNvPr>
-          <p:cNvSpPr/>
-          <p:nvPr/>
-        </p:nvSpPr>
-        <p:spPr>
-          <a:xfrm>
-            <a:off x="8312150" y="3167051"/>
-            <a:ext cx="1426464" cy="1417320"/>
-          </a:xfrm>
-          <a:prstGeom prst="rect">
-            <a:avLst/>
-          </a:prstGeom>
-          <a:solidFill>
-            <a:schemeClr val="bg2"/>
-          </a:solidFill>
-        </p:spPr>
-        <p:style>
-          <a:lnRef idx="2">
-            <a:schemeClr val="accent1">
-              <a:shade val="50000"/>
-            </a:schemeClr>
-          </a:lnRef>
-          <a:fillRef idx="1">
-            <a:schemeClr val="accent1"/>
-          </a:fillRef>
-          <a:effectRef idx="0">
-            <a:schemeClr val="accent1"/>
-          </a:effectRef>
-          <a:fontRef idx="minor">
-            <a:schemeClr val="lt1"/>
-          </a:fontRef>
-        </p:style>
-        <p:txBody>
-          <a:bodyPr rtlCol="0" anchor="ctr"/>
-          <a:lstStyle/>
-          <a:p>
-            <a:pPr algn="ctr"/>
-            <a:endParaRPr lang="nl-BE"/>
-          </a:p>
-        </p:txBody>
-      </p:sp>
-      <p:sp>
-        <p:nvSpPr>
-          <p:cNvPr id="29" name="Rectangle 28">
-            <a:extLst>
-              <a:ext uri="{FF2B5EF4-FFF2-40B4-BE49-F238E27FC236}">
-                <a16:creationId xmlns:a16="http://schemas.microsoft.com/office/drawing/2014/main" id="{A3BE8426-AA2E-4476-8A12-0E8029EB444D}"/>
-              </a:ext>
-            </a:extLst>
-          </p:cNvPr>
-          <p:cNvSpPr/>
-          <p:nvPr/>
-        </p:nvSpPr>
-        <p:spPr>
-          <a:xfrm>
-            <a:off x="10035540" y="3167051"/>
-            <a:ext cx="1426464" cy="1417320"/>
-          </a:xfrm>
-          <a:prstGeom prst="rect">
-            <a:avLst/>
-          </a:prstGeom>
-          <a:solidFill>
-            <a:schemeClr val="bg2"/>
-          </a:solidFill>
-        </p:spPr>
-        <p:style>
-          <a:lnRef idx="2">
-            <a:schemeClr val="accent1">
-              <a:shade val="50000"/>
-            </a:schemeClr>
-          </a:lnRef>
-          <a:fillRef idx="1">
-            <a:schemeClr val="accent1"/>
-          </a:fillRef>
-          <a:effectRef idx="0">
-            <a:schemeClr val="accent1"/>
-          </a:effectRef>
-          <a:fontRef idx="minor">
-            <a:schemeClr val="lt1"/>
-          </a:fontRef>
-        </p:style>
-        <p:txBody>
-          <a:bodyPr rtlCol="0" anchor="ctr"/>
-          <a:lstStyle/>
-          <a:p>
-            <a:pPr algn="ctr"/>
-            <a:endParaRPr lang="nl-BE"/>
-          </a:p>
-        </p:txBody>
-      </p:sp>
-      <p:pic>
-        <p:nvPicPr>
-          <p:cNvPr id="27" name="Picture 26">
-            <a:extLst>
-              <a:ext uri="{FF2B5EF4-FFF2-40B4-BE49-F238E27FC236}">
-                <a16:creationId xmlns:a16="http://schemas.microsoft.com/office/drawing/2014/main" id="{EAB00EF6-64D6-4042-82B6-B8BE7D8D8C4C}"/>
-              </a:ext>
-            </a:extLst>
-          </p:cNvPr>
-          <p:cNvPicPr>
-            <a:picLocks noChangeAspect="1"/>
-          </p:cNvPicPr>
-          <p:nvPr/>
-        </p:nvPicPr>
-        <p:blipFill>
-          <a:blip r:embed="rId5">
-            <a:extLst>
-              <a:ext uri="{28A0092B-C50C-407E-A947-70E740481C1C}">
-                <a14:useLocalDpi xmlns:a14="http://schemas.microsoft.com/office/drawing/2010/main" val="0"/>
-              </a:ext>
-            </a:extLst>
-          </a:blip>
-          <a:stretch>
-            <a:fillRect/>
-          </a:stretch>
-        </p:blipFill>
-        <p:spPr>
-          <a:xfrm>
-            <a:off x="8455715" y="3189911"/>
-            <a:ext cx="1139333" cy="1139333"/>
-          </a:xfrm>
-          <a:prstGeom prst="rect">
-            <a:avLst/>
-          </a:prstGeom>
-        </p:spPr>
-      </p:pic>
-      <p:sp>
-        <p:nvSpPr>
-          <p:cNvPr id="30" name="TextBox 29">
-            <a:extLst>
-              <a:ext uri="{FF2B5EF4-FFF2-40B4-BE49-F238E27FC236}">
-                <a16:creationId xmlns:a16="http://schemas.microsoft.com/office/drawing/2014/main" id="{A7E10A82-5A58-43C7-932A-25CAAD84E472}"/>
-              </a:ext>
-            </a:extLst>
-          </p:cNvPr>
-          <p:cNvSpPr txBox="1"/>
-          <p:nvPr/>
-        </p:nvSpPr>
-        <p:spPr>
-          <a:xfrm>
-            <a:off x="8312150" y="4220052"/>
-            <a:ext cx="1417828" cy="369332"/>
-          </a:xfrm>
-          <a:prstGeom prst="rect">
-            <a:avLst/>
-          </a:prstGeom>
-          <a:noFill/>
-        </p:spPr>
-        <p:txBody>
-          <a:bodyPr wrap="square" rtlCol="0">
-            <a:spAutoFit/>
-          </a:bodyPr>
-          <a:lstStyle/>
-          <a:p>
-            <a:pPr algn="ctr"/>
-            <a:r>
-              <a:rPr lang="nl-BE"/>
-              <a:t>Simon Says</a:t>
-            </a:r>
-            <a:endParaRPr lang="nl-BE" dirty="0"/>
+            <a:r>
+              <a:rPr lang="nl-BE">
+                <a:solidFill>
+                  <a:schemeClr val="tx1"/>
+                </a:solidFill>
+              </a:rPr>
+              <a:t>Random</a:t>
+            </a:r>
           </a:p>
         </p:txBody>
       </p:sp>

</xml_diff>